<commit_message>
updated presentation. Final dfd, Points reduced
</commit_message>
<xml_diff>
--- a/Presentations/Presentation 1.pptx
+++ b/Presentations/Presentation 1.pptx
@@ -7917,7 +7917,11 @@
               <a:t>There is no such system available in the internet like ours, though some fractions of features has been taken from websites like </a:t>
             </a:r>
             <a:r>
-              <a:rPr lang="en-US" sz="1600" u="sng" dirty="0"/>
+              <a:rPr lang="en-US" sz="1600" u="sng" dirty="0">
+                <a:solidFill>
+                  <a:srgbClr val="00B0F0"/>
+                </a:solidFill>
+              </a:rPr>
               <a:t>www.makemytrip.com </a:t>
             </a:r>
             <a:r>
@@ -7925,7 +7929,11 @@
               <a:t>and </a:t>
             </a:r>
             <a:r>
-              <a:rPr lang="en-US" sz="1600" u="sng" dirty="0"/>
+              <a:rPr lang="en-US" sz="1600" u="sng" dirty="0">
+                <a:solidFill>
+                  <a:srgbClr val="00B0F0"/>
+                </a:solidFill>
+              </a:rPr>
               <a:t>www.redbus.com</a:t>
             </a:r>
           </a:p>
@@ -7939,12 +7947,6 @@
             <a:r>
               <a:rPr lang="en-US" sz="1600" dirty="0"/>
               <a:t>In present system a customer has to approach various agencies to find details of places and to book tickets.</a:t>
-            </a:r>
-          </a:p>
-          <a:p>
-            <a:r>
-              <a:rPr lang="en-US" sz="1600" dirty="0"/>
-              <a:t>Processes are done automatically as well as manually, which is the key feature of our system.</a:t>
             </a:r>
           </a:p>
           <a:p>
@@ -9310,10 +9312,9 @@
           </a:p>
           <a:p>
             <a:r>
-              <a:rPr lang="en-IN"/>
-              <a:t>Jugal Prajapati</a:t>
-            </a:r>
-            <a:endParaRPr lang="en-IN" dirty="0"/>
+              <a:rPr lang="en-IN" dirty="0"/>
+              <a:t>Mr. Jugal Prajapati</a:t>
+            </a:r>
           </a:p>
         </p:txBody>
       </p:sp>
@@ -9916,7 +9917,7 @@
             </a:r>
             <a:r>
               <a:rPr lang="en-IN" sz="1600" dirty="0"/>
-              <a:t>MySQL</a:t>
+              <a:t>MySQL 5.5</a:t>
             </a:r>
           </a:p>
           <a:p>
@@ -10289,10 +10290,10 @@
       </p:sp>
       <p:pic>
         <p:nvPicPr>
-          <p:cNvPr id="3" name="Picture 2">
+          <p:cNvPr id="4" name="Picture 3">
             <a:extLst>
               <a:ext uri="{FF2B5EF4-FFF2-40B4-BE49-F238E27FC236}">
-                <a16:creationId xmlns:a16="http://schemas.microsoft.com/office/drawing/2014/main" id="{DA35619D-2D6E-4ABD-A6E0-6CBD5AAE1017}"/>
+                <a16:creationId xmlns:a16="http://schemas.microsoft.com/office/drawing/2014/main" id="{D01DBF70-4C56-41D6-93CC-0E6420810AA6}"/>
               </a:ext>
             </a:extLst>
           </p:cNvPr>
@@ -10309,8 +10310,8 @@
         </p:blipFill>
         <p:spPr>
           <a:xfrm>
-            <a:off x="90377" y="1"/>
-            <a:ext cx="8963247" cy="5264759"/>
+            <a:off x="0" y="-123825"/>
+            <a:ext cx="9144000" cy="5391150"/>
           </a:xfrm>
           <a:prstGeom prst="rect">
             <a:avLst/>
@@ -10455,10 +10456,10 @@
       </p:grpSpPr>
       <p:pic>
         <p:nvPicPr>
-          <p:cNvPr id="4" name="Picture 3">
+          <p:cNvPr id="3" name="Picture 2">
             <a:extLst>
               <a:ext uri="{FF2B5EF4-FFF2-40B4-BE49-F238E27FC236}">
-                <a16:creationId xmlns:a16="http://schemas.microsoft.com/office/drawing/2014/main" id="{9304F168-D7F8-4F84-A6EA-7DA1AB048C06}"/>
+                <a16:creationId xmlns:a16="http://schemas.microsoft.com/office/drawing/2014/main" id="{F9FD3266-B99B-4A08-AEBC-3FC5E40C325D}"/>
               </a:ext>
             </a:extLst>
           </p:cNvPr>
@@ -10475,8 +10476,8 @@
         </p:blipFill>
         <p:spPr>
           <a:xfrm>
-            <a:off x="795130" y="0"/>
-            <a:ext cx="7414592" cy="5143500"/>
+            <a:off x="675860" y="0"/>
+            <a:ext cx="7802217" cy="5143500"/>
           </a:xfrm>
           <a:prstGeom prst="rect">
             <a:avLst/>
@@ -10639,49 +10640,6 @@
               <a:t>Any questions?</a:t>
             </a:r>
             <a:endParaRPr sz="1400" i="1" dirty="0"/>
-          </a:p>
-          <a:p>
-            <a:pPr marL="0" lvl="0" indent="0" algn="ctr" rtl="0">
-              <a:spcBef>
-                <a:spcPts val="0"/>
-              </a:spcBef>
-              <a:spcAft>
-                <a:spcPts val="0"/>
-              </a:spcAft>
-              <a:buClr>
-                <a:schemeClr val="dk1"/>
-              </a:buClr>
-              <a:buSzPts val="1100"/>
-              <a:buFont typeface="Arial"/>
-              <a:buNone/>
-            </a:pPr>
-            <a:r>
-              <a:rPr lang="en" sz="1400" i="1" dirty="0"/>
-              <a:t>You can find us at </a:t>
-            </a:r>
-            <a:r>
-              <a:rPr lang="en" sz="1400" i="1" dirty="0">
-                <a:hlinkClick r:id="rId3"/>
-              </a:rPr>
-              <a:t>kainyash@gmail.com</a:t>
-            </a:r>
-            <a:r>
-              <a:rPr lang="en" sz="1400" i="1" dirty="0"/>
-              <a:t>, </a:t>
-            </a:r>
-            <a:r>
-              <a:rPr lang="en" sz="1400" i="1" u="sng" dirty="0"/>
-              <a:t>vinayvincent15 @gmail.com </a:t>
-            </a:r>
-            <a:r>
-              <a:rPr lang="en" sz="1400" i="1" dirty="0"/>
-              <a:t>&amp; </a:t>
-            </a:r>
-            <a:r>
-              <a:rPr lang="en" sz="1400" i="1" u="sng" dirty="0"/>
-              <a:t>bijesht4 @gmail.com</a:t>
-            </a:r>
-            <a:endParaRPr sz="1400" b="1" i="1" u="sng" dirty="0"/>
           </a:p>
         </p:txBody>
       </p:sp>
@@ -12850,7 +12808,7 @@
                   </a:schemeClr>
                 </a:solidFill>
               </a:rPr>
-              <a:t>: 	(+91) 99786 21654 </a:t>
+              <a:t>: 	(+91) 9586248516</a:t>
             </a:r>
           </a:p>
           <a:p>
@@ -12887,7 +12845,7 @@
                   </a:extLst>
                 </a:hlinkClick>
               </a:rPr>
-              <a:t>info@akashsir.com</a:t>
+              <a:t>info@aarniktechnology.com</a:t>
             </a:r>
             <a:endParaRPr lang="en-IN" dirty="0">
               <a:solidFill>
@@ -12929,13 +12887,16 @@
                   </a:extLst>
                 </a:hlinkClick>
               </a:rPr>
-              <a:t>https://www.akashsir.com</a:t>
-            </a:r>
-            <a:endParaRPr lang="en-IN" dirty="0">
-              <a:solidFill>
-                <a:srgbClr val="00B0F0"/>
-              </a:solidFill>
-            </a:endParaRPr>
+              <a:t>https://aarniktechnology.com</a:t>
+            </a:r>
+            <a:r>
+              <a:rPr lang="en-IN" dirty="0">
+                <a:solidFill>
+                  <a:srgbClr val="00B0F0"/>
+                </a:solidFill>
+              </a:rPr>
+              <a:t>/</a:t>
+            </a:r>
           </a:p>
           <a:p>
             <a:pPr marL="88901" indent="0">

</xml_diff>